<commit_message>
Final Draft of pptx
</commit_message>
<xml_diff>
--- a/Prudential Bot.pptx
+++ b/Prudential Bot.pptx
@@ -4877,10 +4877,10 @@
             </a:lnSpc>
           </a:pPr>
           <a:r>
-            <a:rPr lang="en-IN"/>
+            <a:rPr lang="en-IN" dirty="0"/>
             <a:t>I’m high net worth individual; I’m an investor, having diversified investment. Whenever bad news spreads in the market, I need to know beforehand that how does it affect my portfolio. </a:t>
           </a:r>
-          <a:endParaRPr lang="en-US"/>
+          <a:endParaRPr lang="en-US" dirty="0"/>
         </a:p>
       </dgm:t>
     </dgm:pt>
@@ -4919,10 +4919,30 @@
             </a:lnSpc>
           </a:pPr>
           <a:r>
+            <a:rPr lang="en-IN" dirty="0"/>
+            <a:t>This where the Prudential Bot </a:t>
+          </a:r>
+          <a:r>
+            <a:rPr lang="en-IN" dirty="0" smtClean="0"/>
+            <a:t>comes to </a:t>
+          </a:r>
+          <a:r>
+            <a:rPr lang="en-IN" dirty="0"/>
+            <a:t>rescue. It reads news </a:t>
+          </a:r>
+          <a:r>
             <a:rPr lang="en-IN"/>
-            <a:t>This where the Prudential Bot came to rescue. It reads news every few minutes and checks my current investment; and then alerts the end user how it could affect my portfolio.</a:t>
+            <a:t>every </a:t>
           </a:r>
-          <a:endParaRPr lang="en-US"/>
+          <a:r>
+            <a:rPr lang="en-IN" smtClean="0"/>
+            <a:t>hour and </a:t>
+          </a:r>
+          <a:r>
+            <a:rPr lang="en-IN" dirty="0"/>
+            <a:t>checks my current investment; and then alerts the end user how it could affect my portfolio.</a:t>
+          </a:r>
+          <a:endParaRPr lang="en-US" dirty="0"/>
         </a:p>
       </dgm:t>
     </dgm:pt>
@@ -7534,10 +7554,10 @@
             </a:spcAft>
           </a:pPr>
           <a:r>
-            <a:rPr lang="en-IN" sz="2200" kern="1200"/>
+            <a:rPr lang="en-IN" sz="2200" kern="1200" dirty="0"/>
             <a:t>I’m high net worth individual; I’m an investor, having diversified investment. Whenever bad news spreads in the market, I need to know beforehand that how does it affect my portfolio. </a:t>
           </a:r>
-          <a:endParaRPr lang="en-US" sz="2200" kern="1200"/>
+          <a:endParaRPr lang="en-US" sz="2200" kern="1200" dirty="0"/>
         </a:p>
       </dsp:txBody>
       <dsp:txXfrm>
@@ -7685,10 +7705,30 @@
             </a:spcAft>
           </a:pPr>
           <a:r>
+            <a:rPr lang="en-IN" sz="2200" kern="1200" dirty="0"/>
+            <a:t>This where the Prudential Bot </a:t>
+          </a:r>
+          <a:r>
+            <a:rPr lang="en-IN" sz="2200" kern="1200" dirty="0" smtClean="0"/>
+            <a:t>comes to </a:t>
+          </a:r>
+          <a:r>
+            <a:rPr lang="en-IN" sz="2200" kern="1200" dirty="0"/>
+            <a:t>rescue. It reads news </a:t>
+          </a:r>
+          <a:r>
             <a:rPr lang="en-IN" sz="2200" kern="1200"/>
-            <a:t>This where the Prudential Bot came to rescue. It reads news every few minutes and checks my current investment; and then alerts the end user how it could affect my portfolio.</a:t>
+            <a:t>every </a:t>
           </a:r>
-          <a:endParaRPr lang="en-US" sz="2200" kern="1200"/>
+          <a:r>
+            <a:rPr lang="en-IN" sz="2200" kern="1200" smtClean="0"/>
+            <a:t>hour and </a:t>
+          </a:r>
+          <a:r>
+            <a:rPr lang="en-IN" sz="2200" kern="1200" dirty="0"/>
+            <a:t>checks my current investment; and then alerts the end user how it could affect my portfolio.</a:t>
+          </a:r>
+          <a:endParaRPr lang="en-US" sz="2200" kern="1200" dirty="0"/>
         </a:p>
       </dsp:txBody>
       <dsp:txXfrm>
@@ -22723,7 +22763,7 @@
             <p:ph idx="1"/>
             <p:extLst>
               <p:ext uri="{D42A27DB-BD31-4B8C-83A1-F6EECF244321}">
-                <p14:modId xmlns:p14="http://schemas.microsoft.com/office/powerpoint/2010/main" val="292192335"/>
+                <p14:modId xmlns:p14="http://schemas.microsoft.com/office/powerpoint/2010/main" val="211682706"/>
               </p:ext>
             </p:extLst>
           </p:nvPr>

</xml_diff>